<commit_message>
minor change in slide
</commit_message>
<xml_diff>
--- a/tasks/week-02/week-material/slide.pptx
+++ b/tasks/week-02/week-material/slide.pptx
@@ -309,7 +309,7 @@
           <a:p>
             <a:fld id="{6C7BA811-8917-4F1D-B22F-E96045BFA4E0}" type="datetimeFigureOut">
               <a:rPr lang="en-US" smtClean="0"/>
-              <a:t>10/30/2023</a:t>
+              <a:t>11/2/2023</a:t>
             </a:fld>
             <a:endParaRPr lang="en-US" dirty="0"/>
           </a:p>
@@ -22770,7 +22770,9 @@
           <a:lstStyle/>
           <a:p>
             <a:r>
-              <a:rPr lang="en-US" dirty="0"/>
+              <a:rPr lang="en-US" dirty="0">
+                <a:latin typeface="-apple-system"/>
+              </a:rPr>
               <a:t>Common Root Finding Algorithms:</a:t>
             </a:r>
           </a:p>
@@ -33419,8 +33421,8 @@
           </a:p>
         </p:txBody>
       </p:sp>
-      <mc:AlternateContent xmlns:mc="http://schemas.openxmlformats.org/markup-compatibility/2006">
-        <mc:Choice xmlns:a14="http://schemas.microsoft.com/office/drawing/2010/main" Requires="a14">
+      <mc:AlternateContent xmlns:mc="http://schemas.openxmlformats.org/markup-compatibility/2006" xmlns:a14="http://schemas.microsoft.com/office/drawing/2010/main">
+        <mc:Choice Requires="a14">
           <p:sp>
             <p:nvSpPr>
               <p:cNvPr id="6" name="Content Placeholder 5">
@@ -33572,7 +33574,7 @@
             </p:txBody>
           </p:sp>
         </mc:Choice>
-        <mc:Fallback>
+        <mc:Fallback xmlns="">
           <p:sp>
             <p:nvSpPr>
               <p:cNvPr id="6" name="Content Placeholder 5">
@@ -36892,24 +36894,6 @@
 </file>
 
 <file path=customXml/item1.xml><?xml version="1.0" encoding="utf-8"?>
-<?mso-contentType ?>
-<FormTemplates xmlns="http://schemas.microsoft.com/sharepoint/v3/contenttype/forms">
-  <Display>DocumentLibraryForm</Display>
-  <Edit>DocumentLibraryForm</Edit>
-  <New>DocumentLibraryForm</New>
-</FormTemplates>
-</file>
-
-<file path=customXml/item2.xml><?xml version="1.0" encoding="utf-8"?>
-<p:properties xmlns:p="http://schemas.microsoft.com/office/2006/metadata/properties" xmlns:xsi="http://www.w3.org/2001/XMLSchema-instance" xmlns:pc="http://schemas.microsoft.com/office/infopath/2007/PartnerControls">
-  <documentManagement>
-    <Status xmlns="71af3243-3dd4-4a8d-8c0d-dd76da1f02a5">Not started</Status>
-    <MediaServiceKeyPoints xmlns="71af3243-3dd4-4a8d-8c0d-dd76da1f02a5" xsi:nil="true"/>
-  </documentManagement>
-</p:properties>
-</file>
-
-<file path=customXml/item3.xml><?xml version="1.0" encoding="utf-8"?>
 <ct:contentTypeSchema xmlns:ct="http://schemas.microsoft.com/office/2006/metadata/contentType" xmlns:ma="http://schemas.microsoft.com/office/2006/metadata/properties/metaAttributes" ct:_="" ma:_="" ma:contentTypeName="Document" ma:contentTypeID="0x01010079F111ED35F8CC479449609E8A0923A6" ma:contentTypeVersion="12" ma:contentTypeDescription="Create a new document." ma:contentTypeScope="" ma:versionID="426e97fa315356fffbdcd9876fe988c2">
   <xsd:schema xmlns:xsd="http://www.w3.org/2001/XMLSchema" xmlns:xs="http://www.w3.org/2001/XMLSchema" xmlns:p="http://schemas.microsoft.com/office/2006/metadata/properties" xmlns:ns2="71af3243-3dd4-4a8d-8c0d-dd76da1f02a5" xmlns:ns3="16c05727-aa75-4e4a-9b5f-8a80a1165891" targetNamespace="http://schemas.microsoft.com/office/2006/metadata/properties" ma:root="true" ma:fieldsID="14b8f0def80e6d70ce3def20c90759ae" ns2:_="" ns3:_="">
     <xsd:import namespace="71af3243-3dd4-4a8d-8c0d-dd76da1f02a5"/>
@@ -37130,25 +37114,25 @@
 </ct:contentTypeSchema>
 </file>
 
-<file path=customXml/itemProps1.xml><?xml version="1.0" encoding="utf-8"?>
-<ds:datastoreItem xmlns:ds="http://schemas.openxmlformats.org/officeDocument/2006/customXml" ds:itemID="{1A449C04-64B3-4403-94B7-8D2284C38D1B}">
-  <ds:schemaRefs>
-    <ds:schemaRef ds:uri="http://schemas.microsoft.com/sharepoint/v3/contenttype/forms"/>
-  </ds:schemaRefs>
-</ds:datastoreItem>
+<file path=customXml/item2.xml><?xml version="1.0" encoding="utf-8"?>
+<?mso-contentType ?>
+<FormTemplates xmlns="http://schemas.microsoft.com/sharepoint/v3/contenttype/forms">
+  <Display>DocumentLibraryForm</Display>
+  <Edit>DocumentLibraryForm</Edit>
+  <New>DocumentLibraryForm</New>
+</FormTemplates>
 </file>
 
-<file path=customXml/itemProps2.xml><?xml version="1.0" encoding="utf-8"?>
-<ds:datastoreItem xmlns:ds="http://schemas.openxmlformats.org/officeDocument/2006/customXml" ds:itemID="{FBDEF148-1770-458F-8F5B-C3D0A278AA97}">
-  <ds:schemaRefs>
-    <ds:schemaRef ds:uri="http://schemas.microsoft.com/office/2006/metadata/properties"/>
-    <ds:schemaRef ds:uri="http://schemas.microsoft.com/office/infopath/2007/PartnerControls"/>
-    <ds:schemaRef ds:uri="71af3243-3dd4-4a8d-8c0d-dd76da1f02a5"/>
-  </ds:schemaRefs>
-</ds:datastoreItem>
+<file path=customXml/item3.xml><?xml version="1.0" encoding="utf-8"?>
+<p:properties xmlns:p="http://schemas.microsoft.com/office/2006/metadata/properties" xmlns:xsi="http://www.w3.org/2001/XMLSchema-instance" xmlns:pc="http://schemas.microsoft.com/office/infopath/2007/PartnerControls">
+  <documentManagement>
+    <Status xmlns="71af3243-3dd4-4a8d-8c0d-dd76da1f02a5">Not started</Status>
+    <MediaServiceKeyPoints xmlns="71af3243-3dd4-4a8d-8c0d-dd76da1f02a5" xsi:nil="true"/>
+  </documentManagement>
+</p:properties>
 </file>
 
-<file path=customXml/itemProps3.xml><?xml version="1.0" encoding="utf-8"?>
+<file path=customXml/itemProps1.xml><?xml version="1.0" encoding="utf-8"?>
 <ds:datastoreItem xmlns:ds="http://schemas.openxmlformats.org/officeDocument/2006/customXml" ds:itemID="{8413533D-8C39-401E-8B75-B1AEEEC56B93}">
   <ds:schemaRefs>
     <ds:schemaRef ds:uri="http://schemas.microsoft.com/office/2006/metadata/contentType"/>
@@ -37165,4 +37149,22 @@
     <ds:schemaRef ds:uri="http://schemas.microsoft.com/internal/obd"/>
   </ds:schemaRefs>
 </ds:datastoreItem>
+</file>
+
+<file path=customXml/itemProps2.xml><?xml version="1.0" encoding="utf-8"?>
+<ds:datastoreItem xmlns:ds="http://schemas.openxmlformats.org/officeDocument/2006/customXml" ds:itemID="{1A449C04-64B3-4403-94B7-8D2284C38D1B}">
+  <ds:schemaRefs>
+    <ds:schemaRef ds:uri="http://schemas.microsoft.com/sharepoint/v3/contenttype/forms"/>
+  </ds:schemaRefs>
+</ds:datastoreItem>
+</file>
+
+<file path=customXml/itemProps3.xml><?xml version="1.0" encoding="utf-8"?>
+<ds:datastoreItem xmlns:ds="http://schemas.openxmlformats.org/officeDocument/2006/customXml" ds:itemID="{FBDEF148-1770-458F-8F5B-C3D0A278AA97}">
+  <ds:schemaRefs>
+    <ds:schemaRef ds:uri="http://schemas.microsoft.com/office/2006/metadata/properties"/>
+    <ds:schemaRef ds:uri="http://schemas.microsoft.com/office/infopath/2007/PartnerControls"/>
+    <ds:schemaRef ds:uri="71af3243-3dd4-4a8d-8c0d-dd76da1f02a5"/>
+  </ds:schemaRefs>
+</ds:datastoreItem>
 </file>
</xml_diff>